<commit_message>
Use jpg for figure
</commit_message>
<xml_diff>
--- a/src/media/interactive-vs-workflow.pptx
+++ b/src/media/interactive-vs-workflow.pptx
@@ -2952,10 +2952,10 @@
         </p:nvGrpSpPr>
         <p:grpSpPr>
           <a:xfrm>
-            <a:off x="211917" y="572070"/>
-            <a:ext cx="3096349" cy="2113345"/>
-            <a:chOff x="518304" y="1342777"/>
-            <a:chExt cx="2661352" cy="1868672"/>
+            <a:off x="49543" y="411956"/>
+            <a:ext cx="3415344" cy="2334884"/>
+            <a:chOff x="378741" y="1201201"/>
+            <a:chExt cx="2935532" cy="2064562"/>
           </a:xfrm>
         </p:grpSpPr>
         <p:pic>
@@ -2974,8 +2974,8 @@
           </p:blipFill>
           <p:spPr>
             <a:xfrm>
-              <a:off x="518304" y="1342777"/>
-              <a:ext cx="1005695" cy="1684071"/>
+              <a:off x="378741" y="1335359"/>
+              <a:ext cx="1152799" cy="1930404"/>
             </a:xfrm>
             <a:prstGeom prst="rect">
               <a:avLst/>
@@ -2998,8 +2998,8 @@
           </p:blipFill>
           <p:spPr>
             <a:xfrm>
-              <a:off x="1863783" y="1369021"/>
-              <a:ext cx="1315873" cy="706649"/>
+              <a:off x="1610347" y="1201201"/>
+              <a:ext cx="1703926" cy="915042"/>
             </a:xfrm>
             <a:prstGeom prst="rect">
               <a:avLst/>
@@ -3021,8 +3021,8 @@
           </p:blipFill>
           <p:spPr>
             <a:xfrm>
-              <a:off x="1851504" y="2512715"/>
-              <a:ext cx="1328152" cy="698734"/>
+              <a:off x="1606250" y="2398593"/>
+              <a:ext cx="1648315" cy="867170"/>
             </a:xfrm>
             <a:prstGeom prst="rect">
               <a:avLst/>

</xml_diff>